<commit_message>
added all greta's nndc data
</commit_message>
<xml_diff>
--- a/Documents/Slides 1 - 2025-06-20.pptx
+++ b/Documents/Slides 1 - 2025-06-20.pptx
@@ -9,6 +9,8 @@
     <p:sldId id="257" r:id="rId3"/>
     <p:sldId id="258" r:id="rId4"/>
     <p:sldId id="259" r:id="rId5"/>
+    <p:sldId id="260" r:id="rId6"/>
+    <p:sldId id="261" r:id="rId7"/>
   </p:sldIdLst>
   <p:sldSz cx="12192000" cy="6858000"/>
   <p:notesSz cx="6858000" cy="9144000"/>
@@ -262,7 +264,7 @@
           <a:p>
             <a:fld id="{924973B8-D3A4-404C-B3D2-34A2D79AE327}" type="datetimeFigureOut">
               <a:rPr lang="en-US" smtClean="0"/>
-              <a:t>06/21/2025</a:t>
+              <a:t>6/24/2025</a:t>
             </a:fld>
             <a:endParaRPr lang="en-US"/>
           </a:p>
@@ -460,7 +462,7 @@
           <a:p>
             <a:fld id="{924973B8-D3A4-404C-B3D2-34A2D79AE327}" type="datetimeFigureOut">
               <a:rPr lang="en-US" smtClean="0"/>
-              <a:t>06/21/2025</a:t>
+              <a:t>6/24/2025</a:t>
             </a:fld>
             <a:endParaRPr lang="en-US"/>
           </a:p>
@@ -668,7 +670,7 @@
           <a:p>
             <a:fld id="{924973B8-D3A4-404C-B3D2-34A2D79AE327}" type="datetimeFigureOut">
               <a:rPr lang="en-US" smtClean="0"/>
-              <a:t>06/21/2025</a:t>
+              <a:t>6/24/2025</a:t>
             </a:fld>
             <a:endParaRPr lang="en-US"/>
           </a:p>
@@ -866,7 +868,7 @@
           <a:p>
             <a:fld id="{924973B8-D3A4-404C-B3D2-34A2D79AE327}" type="datetimeFigureOut">
               <a:rPr lang="en-US" smtClean="0"/>
-              <a:t>06/21/2025</a:t>
+              <a:t>6/24/2025</a:t>
             </a:fld>
             <a:endParaRPr lang="en-US"/>
           </a:p>
@@ -1141,7 +1143,7 @@
           <a:p>
             <a:fld id="{924973B8-D3A4-404C-B3D2-34A2D79AE327}" type="datetimeFigureOut">
               <a:rPr lang="en-US" smtClean="0"/>
-              <a:t>06/21/2025</a:t>
+              <a:t>6/24/2025</a:t>
             </a:fld>
             <a:endParaRPr lang="en-US"/>
           </a:p>
@@ -1406,7 +1408,7 @@
           <a:p>
             <a:fld id="{924973B8-D3A4-404C-B3D2-34A2D79AE327}" type="datetimeFigureOut">
               <a:rPr lang="en-US" smtClean="0"/>
-              <a:t>06/21/2025</a:t>
+              <a:t>6/24/2025</a:t>
             </a:fld>
             <a:endParaRPr lang="en-US"/>
           </a:p>
@@ -1818,7 +1820,7 @@
           <a:p>
             <a:fld id="{924973B8-D3A4-404C-B3D2-34A2D79AE327}" type="datetimeFigureOut">
               <a:rPr lang="en-US" smtClean="0"/>
-              <a:t>06/21/2025</a:t>
+              <a:t>6/24/2025</a:t>
             </a:fld>
             <a:endParaRPr lang="en-US"/>
           </a:p>
@@ -1959,7 +1961,7 @@
           <a:p>
             <a:fld id="{924973B8-D3A4-404C-B3D2-34A2D79AE327}" type="datetimeFigureOut">
               <a:rPr lang="en-US" smtClean="0"/>
-              <a:t>06/21/2025</a:t>
+              <a:t>6/24/2025</a:t>
             </a:fld>
             <a:endParaRPr lang="en-US"/>
           </a:p>
@@ -2072,7 +2074,7 @@
           <a:p>
             <a:fld id="{924973B8-D3A4-404C-B3D2-34A2D79AE327}" type="datetimeFigureOut">
               <a:rPr lang="en-US" smtClean="0"/>
-              <a:t>06/21/2025</a:t>
+              <a:t>6/24/2025</a:t>
             </a:fld>
             <a:endParaRPr lang="en-US"/>
           </a:p>
@@ -2383,7 +2385,7 @@
           <a:p>
             <a:fld id="{924973B8-D3A4-404C-B3D2-34A2D79AE327}" type="datetimeFigureOut">
               <a:rPr lang="en-US" smtClean="0"/>
-              <a:t>06/21/2025</a:t>
+              <a:t>6/24/2025</a:t>
             </a:fld>
             <a:endParaRPr lang="en-US"/>
           </a:p>
@@ -2671,7 +2673,7 @@
           <a:p>
             <a:fld id="{924973B8-D3A4-404C-B3D2-34A2D79AE327}" type="datetimeFigureOut">
               <a:rPr lang="en-US" smtClean="0"/>
-              <a:t>06/21/2025</a:t>
+              <a:t>6/24/2025</a:t>
             </a:fld>
             <a:endParaRPr lang="en-US"/>
           </a:p>
@@ -2912,7 +2914,7 @@
           <a:p>
             <a:fld id="{924973B8-D3A4-404C-B3D2-34A2D79AE327}" type="datetimeFigureOut">
               <a:rPr lang="en-US" smtClean="0"/>
-              <a:t>06/21/2025</a:t>
+              <a:t>6/24/2025</a:t>
             </a:fld>
             <a:endParaRPr lang="en-US"/>
           </a:p>
@@ -4715,10 +4717,160 @@
           <a:chExt cx="0" cy="0"/>
         </a:xfrm>
       </p:grpSpPr>
+      <p:pic>
+        <p:nvPicPr>
+          <p:cNvPr id="3" name="Picture 2">
+            <a:extLst>
+              <a:ext uri="{FF2B5EF4-FFF2-40B4-BE49-F238E27FC236}">
+                <a16:creationId xmlns:a16="http://schemas.microsoft.com/office/drawing/2014/main" id="{BE515607-E998-D6EC-BB44-5F74CF795539}"/>
+              </a:ext>
+            </a:extLst>
+          </p:cNvPr>
+          <p:cNvPicPr>
+            <a:picLocks noChangeAspect="1"/>
+          </p:cNvPicPr>
+          <p:nvPr/>
+        </p:nvPicPr>
+        <p:blipFill>
+          <a:blip r:embed="rId2"/>
+          <a:stretch>
+            <a:fillRect/>
+          </a:stretch>
+        </p:blipFill>
+        <p:spPr>
+          <a:xfrm>
+            <a:off x="52902" y="0"/>
+            <a:ext cx="12086195" cy="6858000"/>
+          </a:xfrm>
+          <a:prstGeom prst="rect">
+            <a:avLst/>
+          </a:prstGeom>
+        </p:spPr>
+      </p:pic>
     </p:spTree>
     <p:extLst>
       <p:ext uri="{BB962C8B-B14F-4D97-AF65-F5344CB8AC3E}">
         <p14:creationId xmlns:p14="http://schemas.microsoft.com/office/powerpoint/2010/main" val="3579484288"/>
+      </p:ext>
+    </p:extLst>
+  </p:cSld>
+  <p:clrMapOvr>
+    <a:masterClrMapping/>
+  </p:clrMapOvr>
+</p:sld>
+</file>
+
+<file path=ppt/slides/slide5.xml><?xml version="1.0" encoding="utf-8"?>
+<p:sld xmlns:a="http://schemas.openxmlformats.org/drawingml/2006/main" xmlns:r="http://schemas.openxmlformats.org/officeDocument/2006/relationships" xmlns:p="http://schemas.openxmlformats.org/presentationml/2006/main">
+  <p:cSld>
+    <p:spTree>
+      <p:nvGrpSpPr>
+        <p:cNvPr id="1" name=""/>
+        <p:cNvGrpSpPr/>
+        <p:nvPr/>
+      </p:nvGrpSpPr>
+      <p:grpSpPr>
+        <a:xfrm>
+          <a:off x="0" y="0"/>
+          <a:ext cx="0" cy="0"/>
+          <a:chOff x="0" y="0"/>
+          <a:chExt cx="0" cy="0"/>
+        </a:xfrm>
+      </p:grpSpPr>
+      <p:pic>
+        <p:nvPicPr>
+          <p:cNvPr id="3" name="Picture 2">
+            <a:extLst>
+              <a:ext uri="{FF2B5EF4-FFF2-40B4-BE49-F238E27FC236}">
+                <a16:creationId xmlns:a16="http://schemas.microsoft.com/office/drawing/2014/main" id="{1B9B6593-5B89-D011-1213-DB3EFCAA883B}"/>
+              </a:ext>
+            </a:extLst>
+          </p:cNvPr>
+          <p:cNvPicPr>
+            <a:picLocks noChangeAspect="1"/>
+          </p:cNvPicPr>
+          <p:nvPr/>
+        </p:nvPicPr>
+        <p:blipFill>
+          <a:blip r:embed="rId2"/>
+          <a:stretch>
+            <a:fillRect/>
+          </a:stretch>
+        </p:blipFill>
+        <p:spPr>
+          <a:xfrm>
+            <a:off x="167898" y="0"/>
+            <a:ext cx="11856203" cy="6858000"/>
+          </a:xfrm>
+          <a:prstGeom prst="rect">
+            <a:avLst/>
+          </a:prstGeom>
+        </p:spPr>
+      </p:pic>
+    </p:spTree>
+    <p:extLst>
+      <p:ext uri="{BB962C8B-B14F-4D97-AF65-F5344CB8AC3E}">
+        <p14:creationId xmlns:p14="http://schemas.microsoft.com/office/powerpoint/2010/main" val="14734106"/>
+      </p:ext>
+    </p:extLst>
+  </p:cSld>
+  <p:clrMapOvr>
+    <a:masterClrMapping/>
+  </p:clrMapOvr>
+</p:sld>
+</file>
+
+<file path=ppt/slides/slide6.xml><?xml version="1.0" encoding="utf-8"?>
+<p:sld xmlns:a="http://schemas.openxmlformats.org/drawingml/2006/main" xmlns:r="http://schemas.openxmlformats.org/officeDocument/2006/relationships" xmlns:p="http://schemas.openxmlformats.org/presentationml/2006/main">
+  <p:cSld>
+    <p:spTree>
+      <p:nvGrpSpPr>
+        <p:cNvPr id="1" name=""/>
+        <p:cNvGrpSpPr/>
+        <p:nvPr/>
+      </p:nvGrpSpPr>
+      <p:grpSpPr>
+        <a:xfrm>
+          <a:off x="0" y="0"/>
+          <a:ext cx="0" cy="0"/>
+          <a:chOff x="0" y="0"/>
+          <a:chExt cx="0" cy="0"/>
+        </a:xfrm>
+      </p:grpSpPr>
+      <p:pic>
+        <p:nvPicPr>
+          <p:cNvPr id="3" name="Picture 2">
+            <a:extLst>
+              <a:ext uri="{FF2B5EF4-FFF2-40B4-BE49-F238E27FC236}">
+                <a16:creationId xmlns:a16="http://schemas.microsoft.com/office/drawing/2014/main" id="{95438CC2-C957-2229-699E-659E4F842788}"/>
+              </a:ext>
+            </a:extLst>
+          </p:cNvPr>
+          <p:cNvPicPr>
+            <a:picLocks noChangeAspect="1"/>
+          </p:cNvPicPr>
+          <p:nvPr/>
+        </p:nvPicPr>
+        <p:blipFill>
+          <a:blip r:embed="rId2"/>
+          <a:stretch>
+            <a:fillRect/>
+          </a:stretch>
+        </p:blipFill>
+        <p:spPr>
+          <a:xfrm>
+            <a:off x="199193" y="0"/>
+            <a:ext cx="11793614" cy="6858000"/>
+          </a:xfrm>
+          <a:prstGeom prst="rect">
+            <a:avLst/>
+          </a:prstGeom>
+        </p:spPr>
+      </p:pic>
+    </p:spTree>
+    <p:extLst>
+      <p:ext uri="{BB962C8B-B14F-4D97-AF65-F5344CB8AC3E}">
+        <p14:creationId xmlns:p14="http://schemas.microsoft.com/office/powerpoint/2010/main" val="2702700351"/>
       </p:ext>
     </p:extLst>
   </p:cSld>

</xml_diff>